<commit_message>
Updating README and INVENTOR files
</commit_message>
<xml_diff>
--- a/IMAGES/FIGURES.pptx
+++ b/IMAGES/FIGURES.pptx
@@ -6,6 +6,7 @@
   </p:sldMasterIdLst>
   <p:sldIdLst>
     <p:sldId id="256" r:id="rId2"/>
+    <p:sldId id="257" r:id="rId3"/>
   </p:sldIdLst>
   <p:sldSz cx="12192000" cy="6858000"/>
   <p:notesSz cx="6858000" cy="9144000"/>
@@ -104,6 +105,11 @@
       </a:defRPr>
     </a:lvl9pPr>
   </p:defaultTextStyle>
+  <p:extLst>
+    <p:ext uri="{EFAFB233-063F-42B5-8137-9DF3F51BA10A}">
+      <p15:sldGuideLst xmlns:p15="http://schemas.microsoft.com/office/powerpoint/2012/main"/>
+    </p:ext>
+  </p:extLst>
 </p:presentation>
 </file>
 
@@ -256,7 +262,7 @@
           <a:p>
             <a:fld id="{BF297D92-DF44-6642-BFE1-7F3863464EBA}" type="datetimeFigureOut">
               <a:rPr lang="en-GB" smtClean="0"/>
-              <a:t>01/06/2021</a:t>
+              <a:t>06/06/2021</a:t>
             </a:fld>
             <a:endParaRPr lang="en-GB"/>
           </a:p>
@@ -456,7 +462,7 @@
           <a:p>
             <a:fld id="{BF297D92-DF44-6642-BFE1-7F3863464EBA}" type="datetimeFigureOut">
               <a:rPr lang="en-GB" smtClean="0"/>
-              <a:t>01/06/2021</a:t>
+              <a:t>06/06/2021</a:t>
             </a:fld>
             <a:endParaRPr lang="en-GB"/>
           </a:p>
@@ -666,7 +672,7 @@
           <a:p>
             <a:fld id="{BF297D92-DF44-6642-BFE1-7F3863464EBA}" type="datetimeFigureOut">
               <a:rPr lang="en-GB" smtClean="0"/>
-              <a:t>01/06/2021</a:t>
+              <a:t>06/06/2021</a:t>
             </a:fld>
             <a:endParaRPr lang="en-GB"/>
           </a:p>
@@ -866,7 +872,7 @@
           <a:p>
             <a:fld id="{BF297D92-DF44-6642-BFE1-7F3863464EBA}" type="datetimeFigureOut">
               <a:rPr lang="en-GB" smtClean="0"/>
-              <a:t>01/06/2021</a:t>
+              <a:t>06/06/2021</a:t>
             </a:fld>
             <a:endParaRPr lang="en-GB"/>
           </a:p>
@@ -1142,7 +1148,7 @@
           <a:p>
             <a:fld id="{BF297D92-DF44-6642-BFE1-7F3863464EBA}" type="datetimeFigureOut">
               <a:rPr lang="en-GB" smtClean="0"/>
-              <a:t>01/06/2021</a:t>
+              <a:t>06/06/2021</a:t>
             </a:fld>
             <a:endParaRPr lang="en-GB"/>
           </a:p>
@@ -1410,7 +1416,7 @@
           <a:p>
             <a:fld id="{BF297D92-DF44-6642-BFE1-7F3863464EBA}" type="datetimeFigureOut">
               <a:rPr lang="en-GB" smtClean="0"/>
-              <a:t>01/06/2021</a:t>
+              <a:t>06/06/2021</a:t>
             </a:fld>
             <a:endParaRPr lang="en-GB"/>
           </a:p>
@@ -1825,7 +1831,7 @@
           <a:p>
             <a:fld id="{BF297D92-DF44-6642-BFE1-7F3863464EBA}" type="datetimeFigureOut">
               <a:rPr lang="en-GB" smtClean="0"/>
-              <a:t>01/06/2021</a:t>
+              <a:t>06/06/2021</a:t>
             </a:fld>
             <a:endParaRPr lang="en-GB"/>
           </a:p>
@@ -1967,7 +1973,7 @@
           <a:p>
             <a:fld id="{BF297D92-DF44-6642-BFE1-7F3863464EBA}" type="datetimeFigureOut">
               <a:rPr lang="en-GB" smtClean="0"/>
-              <a:t>01/06/2021</a:t>
+              <a:t>06/06/2021</a:t>
             </a:fld>
             <a:endParaRPr lang="en-GB"/>
           </a:p>
@@ -2080,7 +2086,7 @@
           <a:p>
             <a:fld id="{BF297D92-DF44-6642-BFE1-7F3863464EBA}" type="datetimeFigureOut">
               <a:rPr lang="en-GB" smtClean="0"/>
-              <a:t>01/06/2021</a:t>
+              <a:t>06/06/2021</a:t>
             </a:fld>
             <a:endParaRPr lang="en-GB"/>
           </a:p>
@@ -2393,7 +2399,7 @@
           <a:p>
             <a:fld id="{BF297D92-DF44-6642-BFE1-7F3863464EBA}" type="datetimeFigureOut">
               <a:rPr lang="en-GB" smtClean="0"/>
-              <a:t>01/06/2021</a:t>
+              <a:t>06/06/2021</a:t>
             </a:fld>
             <a:endParaRPr lang="en-GB"/>
           </a:p>
@@ -2682,7 +2688,7 @@
           <a:p>
             <a:fld id="{BF297D92-DF44-6642-BFE1-7F3863464EBA}" type="datetimeFigureOut">
               <a:rPr lang="en-GB" smtClean="0"/>
-              <a:t>01/06/2021</a:t>
+              <a:t>06/06/2021</a:t>
             </a:fld>
             <a:endParaRPr lang="en-GB"/>
           </a:p>
@@ -2925,7 +2931,7 @@
           <a:p>
             <a:fld id="{BF297D92-DF44-6642-BFE1-7F3863464EBA}" type="datetimeFigureOut">
               <a:rPr lang="en-GB" smtClean="0"/>
-              <a:t>01/06/2021</a:t>
+              <a:t>06/06/2021</a:t>
             </a:fld>
             <a:endParaRPr lang="en-GB"/>
           </a:p>
@@ -4217,10 +4223,953 @@
           </a:p>
         </p:txBody>
       </p:sp>
+      <p:pic>
+        <p:nvPicPr>
+          <p:cNvPr id="2" name="Picture 2" descr="Bild 3 von 4">
+            <a:extLst>
+              <a:ext uri="{FF2B5EF4-FFF2-40B4-BE49-F238E27FC236}">
+                <a16:creationId xmlns:a16="http://schemas.microsoft.com/office/drawing/2014/main" id="{DB71660D-F23F-0543-9D49-0199859F33B4}"/>
+              </a:ext>
+            </a:extLst>
+          </p:cNvPr>
+          <p:cNvPicPr>
+            <a:picLocks noChangeAspect="1" noChangeArrowheads="1"/>
+          </p:cNvPicPr>
+          <p:nvPr/>
+        </p:nvPicPr>
+        <p:blipFill>
+          <a:blip r:embed="rId9">
+            <a:extLst>
+              <a:ext uri="{28A0092B-C50C-407E-A947-70E740481C1C}">
+                <a14:useLocalDpi xmlns:a14="http://schemas.microsoft.com/office/drawing/2010/main" val="0"/>
+              </a:ext>
+            </a:extLst>
+          </a:blip>
+          <a:srcRect/>
+          <a:stretch>
+            <a:fillRect/>
+          </a:stretch>
+        </p:blipFill>
+        <p:spPr bwMode="auto">
+          <a:xfrm rot="16200000">
+            <a:off x="8012705" y="4926156"/>
+            <a:ext cx="2426773" cy="3521552"/>
+          </a:xfrm>
+          <a:prstGeom prst="rect">
+            <a:avLst/>
+          </a:prstGeom>
+          <a:noFill/>
+          <a:extLst>
+            <a:ext uri="{909E8E84-426E-40DD-AFC4-6F175D3DCCD1}">
+              <a14:hiddenFill xmlns:a14="http://schemas.microsoft.com/office/drawing/2010/main">
+                <a:solidFill>
+                  <a:srgbClr val="FFFFFF"/>
+                </a:solidFill>
+              </a14:hiddenFill>
+            </a:ext>
+          </a:extLst>
+        </p:spPr>
+      </p:pic>
+      <p:cxnSp>
+        <p:nvCxnSpPr>
+          <p:cNvPr id="22" name="Gerade Verbindung 21">
+            <a:extLst>
+              <a:ext uri="{FF2B5EF4-FFF2-40B4-BE49-F238E27FC236}">
+                <a16:creationId xmlns:a16="http://schemas.microsoft.com/office/drawing/2014/main" id="{51CC84FA-B6DB-9F40-B63E-95125D64EAC2}"/>
+              </a:ext>
+            </a:extLst>
+          </p:cNvPr>
+          <p:cNvCxnSpPr>
+            <a:cxnSpLocks/>
+          </p:cNvCxnSpPr>
+          <p:nvPr/>
+        </p:nvCxnSpPr>
+        <p:spPr>
+          <a:xfrm>
+            <a:off x="3501483" y="7292153"/>
+            <a:ext cx="3963832" cy="0"/>
+          </a:xfrm>
+          <a:prstGeom prst="line">
+            <a:avLst/>
+          </a:prstGeom>
+          <a:ln w="76200">
+            <a:solidFill>
+              <a:srgbClr val="FFFF00"/>
+            </a:solidFill>
+          </a:ln>
+        </p:spPr>
+        <p:style>
+          <a:lnRef idx="1">
+            <a:schemeClr val="accent1"/>
+          </a:lnRef>
+          <a:fillRef idx="0">
+            <a:schemeClr val="accent1"/>
+          </a:fillRef>
+          <a:effectRef idx="0">
+            <a:schemeClr val="accent1"/>
+          </a:effectRef>
+          <a:fontRef idx="minor">
+            <a:schemeClr val="tx1"/>
+          </a:fontRef>
+        </p:style>
+      </p:cxnSp>
+      <p:cxnSp>
+        <p:nvCxnSpPr>
+          <p:cNvPr id="24" name="Gerade Verbindung 23">
+            <a:extLst>
+              <a:ext uri="{FF2B5EF4-FFF2-40B4-BE49-F238E27FC236}">
+                <a16:creationId xmlns:a16="http://schemas.microsoft.com/office/drawing/2014/main" id="{1D4BD6E4-3822-B44A-AD4A-48C8EBA1C8A5}"/>
+              </a:ext>
+            </a:extLst>
+          </p:cNvPr>
+          <p:cNvCxnSpPr>
+            <a:cxnSpLocks/>
+          </p:cNvCxnSpPr>
+          <p:nvPr/>
+        </p:nvCxnSpPr>
+        <p:spPr>
+          <a:xfrm>
+            <a:off x="3547520" y="6686932"/>
+            <a:ext cx="0" cy="633254"/>
+          </a:xfrm>
+          <a:prstGeom prst="line">
+            <a:avLst/>
+          </a:prstGeom>
+          <a:ln w="76200">
+            <a:solidFill>
+              <a:srgbClr val="FFFF00"/>
+            </a:solidFill>
+          </a:ln>
+        </p:spPr>
+        <p:style>
+          <a:lnRef idx="1">
+            <a:schemeClr val="accent1"/>
+          </a:lnRef>
+          <a:fillRef idx="0">
+            <a:schemeClr val="accent1"/>
+          </a:fillRef>
+          <a:effectRef idx="0">
+            <a:schemeClr val="accent1"/>
+          </a:effectRef>
+          <a:fontRef idx="minor">
+            <a:schemeClr val="tx1"/>
+          </a:fontRef>
+        </p:style>
+      </p:cxnSp>
+      <p:cxnSp>
+        <p:nvCxnSpPr>
+          <p:cNvPr id="27" name="Gerade Verbindung 26">
+            <a:extLst>
+              <a:ext uri="{FF2B5EF4-FFF2-40B4-BE49-F238E27FC236}">
+                <a16:creationId xmlns:a16="http://schemas.microsoft.com/office/drawing/2014/main" id="{3060CEB6-7858-5249-A0F0-97B2D19FA107}"/>
+              </a:ext>
+            </a:extLst>
+          </p:cNvPr>
+          <p:cNvCxnSpPr>
+            <a:cxnSpLocks/>
+          </p:cNvCxnSpPr>
+          <p:nvPr/>
+        </p:nvCxnSpPr>
+        <p:spPr>
+          <a:xfrm>
+            <a:off x="3567538" y="4587240"/>
+            <a:ext cx="0" cy="1445941"/>
+          </a:xfrm>
+          <a:prstGeom prst="line">
+            <a:avLst/>
+          </a:prstGeom>
+          <a:ln w="76200">
+            <a:solidFill>
+              <a:srgbClr val="FFFF00"/>
+            </a:solidFill>
+          </a:ln>
+        </p:spPr>
+        <p:style>
+          <a:lnRef idx="1">
+            <a:schemeClr val="accent1"/>
+          </a:lnRef>
+          <a:fillRef idx="0">
+            <a:schemeClr val="accent1"/>
+          </a:fillRef>
+          <a:effectRef idx="0">
+            <a:schemeClr val="accent1"/>
+          </a:effectRef>
+          <a:fontRef idx="minor">
+            <a:schemeClr val="tx1"/>
+          </a:fontRef>
+        </p:style>
+      </p:cxnSp>
+      <p:sp>
+        <p:nvSpPr>
+          <p:cNvPr id="29" name="Textfeld 28">
+            <a:extLst>
+              <a:ext uri="{FF2B5EF4-FFF2-40B4-BE49-F238E27FC236}">
+                <a16:creationId xmlns:a16="http://schemas.microsoft.com/office/drawing/2014/main" id="{5C9B941E-04DD-DA48-894C-8A29E779BEC6}"/>
+              </a:ext>
+            </a:extLst>
+          </p:cNvPr>
+          <p:cNvSpPr txBox="1"/>
+          <p:nvPr/>
+        </p:nvSpPr>
+        <p:spPr>
+          <a:xfrm>
+            <a:off x="3390900" y="7397642"/>
+            <a:ext cx="2776529" cy="646331"/>
+          </a:xfrm>
+          <a:prstGeom prst="rect">
+            <a:avLst/>
+          </a:prstGeom>
+          <a:noFill/>
+        </p:spPr>
+        <p:txBody>
+          <a:bodyPr wrap="none" rtlCol="0">
+            <a:spAutoFit/>
+          </a:bodyPr>
+          <a:lstStyle/>
+          <a:p>
+            <a:r>
+              <a:rPr lang="en-GB" b="1" i="1" dirty="0"/>
+              <a:t>USB:</a:t>
+            </a:r>
+          </a:p>
+          <a:p>
+            <a:r>
+              <a:rPr lang="en-GB" dirty="0"/>
+              <a:t>USB-Micro Cable (5V, GND)</a:t>
+            </a:r>
+          </a:p>
+        </p:txBody>
+      </p:sp>
+      <p:sp>
+        <p:nvSpPr>
+          <p:cNvPr id="30" name="Rechteck 29">
+            <a:extLst>
+              <a:ext uri="{FF2B5EF4-FFF2-40B4-BE49-F238E27FC236}">
+                <a16:creationId xmlns:a16="http://schemas.microsoft.com/office/drawing/2014/main" id="{3AF82709-1D63-384D-9D54-308A926A5E49}"/>
+              </a:ext>
+            </a:extLst>
+          </p:cNvPr>
+          <p:cNvSpPr/>
+          <p:nvPr/>
+        </p:nvSpPr>
+        <p:spPr>
+          <a:xfrm>
+            <a:off x="7067590" y="5712707"/>
+            <a:ext cx="1821396" cy="646331"/>
+          </a:xfrm>
+          <a:prstGeom prst="rect">
+            <a:avLst/>
+          </a:prstGeom>
+        </p:spPr>
+        <p:txBody>
+          <a:bodyPr wrap="none">
+            <a:spAutoFit/>
+          </a:bodyPr>
+          <a:lstStyle/>
+          <a:p>
+            <a:r>
+              <a:rPr lang="en-GB" b="1" i="1" dirty="0"/>
+              <a:t>USB </a:t>
+            </a:r>
+            <a:r>
+              <a:rPr lang="en-GB" b="1" i="1" dirty="0" err="1"/>
+              <a:t>Powerbank</a:t>
+            </a:r>
+            <a:r>
+              <a:rPr lang="en-GB" b="1" i="1" dirty="0"/>
+              <a:t>, </a:t>
+            </a:r>
+          </a:p>
+          <a:p>
+            <a:r>
+              <a:rPr lang="en-GB" b="1" i="1" dirty="0"/>
+              <a:t>2200mAh</a:t>
+            </a:r>
+          </a:p>
+        </p:txBody>
+      </p:sp>
     </p:spTree>
     <p:extLst>
       <p:ext uri="{BB962C8B-B14F-4D97-AF65-F5344CB8AC3E}">
         <p14:creationId xmlns:p14="http://schemas.microsoft.com/office/powerpoint/2010/main" val="4268847854"/>
+      </p:ext>
+    </p:extLst>
+  </p:cSld>
+  <p:clrMapOvr>
+    <a:masterClrMapping/>
+  </p:clrMapOvr>
+</p:sld>
+</file>
+
+<file path=ppt/slides/slide2.xml><?xml version="1.0" encoding="utf-8"?>
+<p:sld xmlns:a="http://schemas.openxmlformats.org/drawingml/2006/main" xmlns:r="http://schemas.openxmlformats.org/officeDocument/2006/relationships" xmlns:p="http://schemas.openxmlformats.org/presentationml/2006/main">
+  <p:cSld>
+    <p:spTree>
+      <p:nvGrpSpPr>
+        <p:cNvPr id="1" name=""/>
+        <p:cNvGrpSpPr/>
+        <p:nvPr/>
+      </p:nvGrpSpPr>
+      <p:grpSpPr>
+        <a:xfrm>
+          <a:off x="0" y="0"/>
+          <a:ext cx="0" cy="0"/>
+          <a:chOff x="0" y="0"/>
+          <a:chExt cx="0" cy="0"/>
+        </a:xfrm>
+      </p:grpSpPr>
+      <p:pic>
+        <p:nvPicPr>
+          <p:cNvPr id="5" name="Grafik 4">
+            <a:extLst>
+              <a:ext uri="{FF2B5EF4-FFF2-40B4-BE49-F238E27FC236}">
+                <a16:creationId xmlns:a16="http://schemas.microsoft.com/office/drawing/2014/main" id="{E7D14CEB-8406-DE4A-A0AE-9DBB2E233FD9}"/>
+              </a:ext>
+            </a:extLst>
+          </p:cNvPr>
+          <p:cNvPicPr>
+            <a:picLocks noChangeAspect="1"/>
+          </p:cNvPicPr>
+          <p:nvPr/>
+        </p:nvPicPr>
+        <p:blipFill rotWithShape="1">
+          <a:blip r:embed="rId2"/>
+          <a:srcRect l="14929" t="26667" r="14929" b="26667"/>
+          <a:stretch/>
+        </p:blipFill>
+        <p:spPr>
+          <a:xfrm>
+            <a:off x="3089564" y="1828800"/>
+            <a:ext cx="6012872" cy="3200400"/>
+          </a:xfrm>
+          <a:prstGeom prst="rect">
+            <a:avLst/>
+          </a:prstGeom>
+        </p:spPr>
+      </p:pic>
+      <p:sp>
+        <p:nvSpPr>
+          <p:cNvPr id="6" name="Textfeld 5">
+            <a:extLst>
+              <a:ext uri="{FF2B5EF4-FFF2-40B4-BE49-F238E27FC236}">
+                <a16:creationId xmlns:a16="http://schemas.microsoft.com/office/drawing/2014/main" id="{83B34787-73D7-A14C-9170-A34208749697}"/>
+              </a:ext>
+            </a:extLst>
+          </p:cNvPr>
+          <p:cNvSpPr txBox="1"/>
+          <p:nvPr/>
+        </p:nvSpPr>
+        <p:spPr>
+          <a:xfrm>
+            <a:off x="8419821" y="3928842"/>
+            <a:ext cx="2172454" cy="369332"/>
+          </a:xfrm>
+          <a:prstGeom prst="rect">
+            <a:avLst/>
+          </a:prstGeom>
+          <a:noFill/>
+        </p:spPr>
+        <p:txBody>
+          <a:bodyPr wrap="none" rtlCol="0">
+            <a:spAutoFit/>
+          </a:bodyPr>
+          <a:lstStyle/>
+          <a:p>
+            <a:r>
+              <a:rPr lang="en-GB" i="1" dirty="0">
+                <a:latin typeface="Arial" panose="020B0604020202020204" pitchFamily="34" charset="0"/>
+                <a:cs typeface="Arial" panose="020B0604020202020204" pitchFamily="34" charset="0"/>
+              </a:rPr>
+              <a:t>T-Connector (input)</a:t>
+            </a:r>
+          </a:p>
+        </p:txBody>
+      </p:sp>
+      <p:sp>
+        <p:nvSpPr>
+          <p:cNvPr id="9" name="Textfeld 8">
+            <a:extLst>
+              <a:ext uri="{FF2B5EF4-FFF2-40B4-BE49-F238E27FC236}">
+                <a16:creationId xmlns:a16="http://schemas.microsoft.com/office/drawing/2014/main" id="{1825B37A-5DF8-A340-9EBE-A8135AAA0CF8}"/>
+              </a:ext>
+            </a:extLst>
+          </p:cNvPr>
+          <p:cNvSpPr txBox="1"/>
+          <p:nvPr/>
+        </p:nvSpPr>
+        <p:spPr>
+          <a:xfrm>
+            <a:off x="8419821" y="4463926"/>
+            <a:ext cx="1774845" cy="369332"/>
+          </a:xfrm>
+          <a:prstGeom prst="rect">
+            <a:avLst/>
+          </a:prstGeom>
+          <a:noFill/>
+        </p:spPr>
+        <p:txBody>
+          <a:bodyPr wrap="none" rtlCol="0">
+            <a:spAutoFit/>
+          </a:bodyPr>
+          <a:lstStyle/>
+          <a:p>
+            <a:r>
+              <a:rPr lang="en-GB" i="1" dirty="0">
+                <a:latin typeface="Arial" panose="020B0604020202020204" pitchFamily="34" charset="0"/>
+                <a:cs typeface="Arial" panose="020B0604020202020204" pitchFamily="34" charset="0"/>
+              </a:rPr>
+              <a:t>Oxygen Sensor</a:t>
+            </a:r>
+          </a:p>
+        </p:txBody>
+      </p:sp>
+      <p:sp>
+        <p:nvSpPr>
+          <p:cNvPr id="10" name="Textfeld 9">
+            <a:extLst>
+              <a:ext uri="{FF2B5EF4-FFF2-40B4-BE49-F238E27FC236}">
+                <a16:creationId xmlns:a16="http://schemas.microsoft.com/office/drawing/2014/main" id="{67520B65-5B10-944A-867E-67A0B38EF7C8}"/>
+              </a:ext>
+            </a:extLst>
+          </p:cNvPr>
+          <p:cNvSpPr txBox="1"/>
+          <p:nvPr/>
+        </p:nvSpPr>
+        <p:spPr>
+          <a:xfrm>
+            <a:off x="1599725" y="4563071"/>
+            <a:ext cx="2480166" cy="369332"/>
+          </a:xfrm>
+          <a:prstGeom prst="rect">
+            <a:avLst/>
+          </a:prstGeom>
+          <a:noFill/>
+        </p:spPr>
+        <p:txBody>
+          <a:bodyPr wrap="none" rtlCol="0">
+            <a:spAutoFit/>
+          </a:bodyPr>
+          <a:lstStyle/>
+          <a:p>
+            <a:r>
+              <a:rPr lang="en-GB" i="1" dirty="0">
+                <a:latin typeface="Arial" panose="020B0604020202020204" pitchFamily="34" charset="0"/>
+                <a:cs typeface="Arial" panose="020B0604020202020204" pitchFamily="34" charset="0"/>
+              </a:rPr>
+              <a:t>ESP32 microcontroller</a:t>
+            </a:r>
+          </a:p>
+        </p:txBody>
+      </p:sp>
+      <p:sp>
+        <p:nvSpPr>
+          <p:cNvPr id="11" name="Textfeld 10">
+            <a:extLst>
+              <a:ext uri="{FF2B5EF4-FFF2-40B4-BE49-F238E27FC236}">
+                <a16:creationId xmlns:a16="http://schemas.microsoft.com/office/drawing/2014/main" id="{74EA95A2-38DB-CC4F-8EEA-BCC41854D846}"/>
+              </a:ext>
+            </a:extLst>
+          </p:cNvPr>
+          <p:cNvSpPr txBox="1"/>
+          <p:nvPr/>
+        </p:nvSpPr>
+        <p:spPr>
+          <a:xfrm>
+            <a:off x="1599725" y="3680154"/>
+            <a:ext cx="2339102" cy="369332"/>
+          </a:xfrm>
+          <a:prstGeom prst="rect">
+            <a:avLst/>
+          </a:prstGeom>
+          <a:noFill/>
+        </p:spPr>
+        <p:txBody>
+          <a:bodyPr wrap="none" rtlCol="0">
+            <a:spAutoFit/>
+          </a:bodyPr>
+          <a:lstStyle/>
+          <a:p>
+            <a:r>
+              <a:rPr lang="en-GB" i="1" dirty="0">
+                <a:latin typeface="Arial" panose="020B0604020202020204" pitchFamily="34" charset="0"/>
+                <a:cs typeface="Arial" panose="020B0604020202020204" pitchFamily="34" charset="0"/>
+              </a:rPr>
+              <a:t>S-Connector (output)</a:t>
+            </a:r>
+          </a:p>
+        </p:txBody>
+      </p:sp>
+      <p:sp>
+        <p:nvSpPr>
+          <p:cNvPr id="12" name="Textfeld 11">
+            <a:extLst>
+              <a:ext uri="{FF2B5EF4-FFF2-40B4-BE49-F238E27FC236}">
+                <a16:creationId xmlns:a16="http://schemas.microsoft.com/office/drawing/2014/main" id="{90506D14-8D84-0441-93F6-ED377EF04A26}"/>
+              </a:ext>
+            </a:extLst>
+          </p:cNvPr>
+          <p:cNvSpPr txBox="1"/>
+          <p:nvPr/>
+        </p:nvSpPr>
+        <p:spPr>
+          <a:xfrm>
+            <a:off x="1599725" y="4121613"/>
+            <a:ext cx="1903085" cy="369332"/>
+          </a:xfrm>
+          <a:prstGeom prst="rect">
+            <a:avLst/>
+          </a:prstGeom>
+          <a:noFill/>
+        </p:spPr>
+        <p:txBody>
+          <a:bodyPr wrap="none" rtlCol="0">
+            <a:spAutoFit/>
+          </a:bodyPr>
+          <a:lstStyle/>
+          <a:p>
+            <a:r>
+              <a:rPr lang="en-GB" i="1" dirty="0">
+                <a:latin typeface="Arial" panose="020B0604020202020204" pitchFamily="34" charset="0"/>
+                <a:cs typeface="Arial" panose="020B0604020202020204" pitchFamily="34" charset="0"/>
+              </a:rPr>
+              <a:t>Flow-rate sensor</a:t>
+            </a:r>
+          </a:p>
+        </p:txBody>
+      </p:sp>
+      <p:sp>
+        <p:nvSpPr>
+          <p:cNvPr id="13" name="Textfeld 12">
+            <a:extLst>
+              <a:ext uri="{FF2B5EF4-FFF2-40B4-BE49-F238E27FC236}">
+                <a16:creationId xmlns:a16="http://schemas.microsoft.com/office/drawing/2014/main" id="{D818F681-A757-5442-8873-AB64271ED28E}"/>
+              </a:ext>
+            </a:extLst>
+          </p:cNvPr>
+          <p:cNvSpPr txBox="1"/>
+          <p:nvPr/>
+        </p:nvSpPr>
+        <p:spPr>
+          <a:xfrm>
+            <a:off x="8419821" y="3393758"/>
+            <a:ext cx="1877437" cy="369332"/>
+          </a:xfrm>
+          <a:prstGeom prst="rect">
+            <a:avLst/>
+          </a:prstGeom>
+          <a:noFill/>
+        </p:spPr>
+        <p:txBody>
+          <a:bodyPr wrap="none" rtlCol="0">
+            <a:spAutoFit/>
+          </a:bodyPr>
+          <a:lstStyle/>
+          <a:p>
+            <a:r>
+              <a:rPr lang="en-GB" i="1" dirty="0">
+                <a:latin typeface="Arial" panose="020B0604020202020204" pitchFamily="34" charset="0"/>
+                <a:cs typeface="Arial" panose="020B0604020202020204" pitchFamily="34" charset="0"/>
+              </a:rPr>
+              <a:t>USB </a:t>
+            </a:r>
+            <a:r>
+              <a:rPr lang="en-GB" i="1" dirty="0" err="1">
+                <a:latin typeface="Arial" panose="020B0604020202020204" pitchFamily="34" charset="0"/>
+                <a:cs typeface="Arial" panose="020B0604020202020204" pitchFamily="34" charset="0"/>
+              </a:rPr>
+              <a:t>Powerbank</a:t>
+            </a:r>
+            <a:endParaRPr lang="en-GB" i="1" dirty="0">
+              <a:latin typeface="Arial" panose="020B0604020202020204" pitchFamily="34" charset="0"/>
+              <a:cs typeface="Arial" panose="020B0604020202020204" pitchFamily="34" charset="0"/>
+            </a:endParaRPr>
+          </a:p>
+        </p:txBody>
+      </p:sp>
+      <p:sp>
+        <p:nvSpPr>
+          <p:cNvPr id="14" name="Textfeld 13">
+            <a:extLst>
+              <a:ext uri="{FF2B5EF4-FFF2-40B4-BE49-F238E27FC236}">
+                <a16:creationId xmlns:a16="http://schemas.microsoft.com/office/drawing/2014/main" id="{C308AC40-CE4B-8945-974D-DA61782A717A}"/>
+              </a:ext>
+            </a:extLst>
+          </p:cNvPr>
+          <p:cNvSpPr txBox="1"/>
+          <p:nvPr/>
+        </p:nvSpPr>
+        <p:spPr>
+          <a:xfrm>
+            <a:off x="8419821" y="2858674"/>
+            <a:ext cx="1377300" cy="369332"/>
+          </a:xfrm>
+          <a:prstGeom prst="rect">
+            <a:avLst/>
+          </a:prstGeom>
+          <a:noFill/>
+        </p:spPr>
+        <p:txBody>
+          <a:bodyPr wrap="none" rtlCol="0">
+            <a:spAutoFit/>
+          </a:bodyPr>
+          <a:lstStyle/>
+          <a:p>
+            <a:r>
+              <a:rPr lang="en-GB" i="1" dirty="0">
+                <a:latin typeface="Arial" panose="020B0604020202020204" pitchFamily="34" charset="0"/>
+                <a:cs typeface="Arial" panose="020B0604020202020204" pitchFamily="34" charset="0"/>
+              </a:rPr>
+              <a:t>LC-Display </a:t>
+            </a:r>
+          </a:p>
+        </p:txBody>
+      </p:sp>
+      <p:cxnSp>
+        <p:nvCxnSpPr>
+          <p:cNvPr id="8" name="Gerade Verbindung 7">
+            <a:extLst>
+              <a:ext uri="{FF2B5EF4-FFF2-40B4-BE49-F238E27FC236}">
+                <a16:creationId xmlns:a16="http://schemas.microsoft.com/office/drawing/2014/main" id="{755B3EA3-CAF0-0F4E-90F6-79B5F82A3EAE}"/>
+              </a:ext>
+            </a:extLst>
+          </p:cNvPr>
+          <p:cNvCxnSpPr>
+            <a:stCxn id="11" idx="0"/>
+          </p:cNvCxnSpPr>
+          <p:nvPr/>
+        </p:nvCxnSpPr>
+        <p:spPr>
+          <a:xfrm flipV="1">
+            <a:off x="2769276" y="3228006"/>
+            <a:ext cx="733534" cy="452148"/>
+          </a:xfrm>
+          <a:prstGeom prst="line">
+            <a:avLst/>
+          </a:prstGeom>
+        </p:spPr>
+        <p:style>
+          <a:lnRef idx="1">
+            <a:schemeClr val="dk1"/>
+          </a:lnRef>
+          <a:fillRef idx="0">
+            <a:schemeClr val="dk1"/>
+          </a:fillRef>
+          <a:effectRef idx="0">
+            <a:schemeClr val="dk1"/>
+          </a:effectRef>
+          <a:fontRef idx="minor">
+            <a:schemeClr val="tx1"/>
+          </a:fontRef>
+        </p:style>
+      </p:cxnSp>
+      <p:cxnSp>
+        <p:nvCxnSpPr>
+          <p:cNvPr id="17" name="Gerade Verbindung 16">
+            <a:extLst>
+              <a:ext uri="{FF2B5EF4-FFF2-40B4-BE49-F238E27FC236}">
+                <a16:creationId xmlns:a16="http://schemas.microsoft.com/office/drawing/2014/main" id="{7FFF892C-6F6A-B84E-A05C-127433E343C7}"/>
+              </a:ext>
+            </a:extLst>
+          </p:cNvPr>
+          <p:cNvCxnSpPr>
+            <a:cxnSpLocks/>
+          </p:cNvCxnSpPr>
+          <p:nvPr/>
+        </p:nvCxnSpPr>
+        <p:spPr>
+          <a:xfrm flipV="1">
+            <a:off x="3491108" y="3502479"/>
+            <a:ext cx="1309492" cy="845207"/>
+          </a:xfrm>
+          <a:prstGeom prst="line">
+            <a:avLst/>
+          </a:prstGeom>
+        </p:spPr>
+        <p:style>
+          <a:lnRef idx="1">
+            <a:schemeClr val="dk1"/>
+          </a:lnRef>
+          <a:fillRef idx="0">
+            <a:schemeClr val="dk1"/>
+          </a:fillRef>
+          <a:effectRef idx="0">
+            <a:schemeClr val="dk1"/>
+          </a:effectRef>
+          <a:fontRef idx="minor">
+            <a:schemeClr val="tx1"/>
+          </a:fontRef>
+        </p:style>
+      </p:cxnSp>
+      <p:cxnSp>
+        <p:nvCxnSpPr>
+          <p:cNvPr id="19" name="Gerade Verbindung 18">
+            <a:extLst>
+              <a:ext uri="{FF2B5EF4-FFF2-40B4-BE49-F238E27FC236}">
+                <a16:creationId xmlns:a16="http://schemas.microsoft.com/office/drawing/2014/main" id="{AE464019-20BA-4342-9760-78744DEAC068}"/>
+              </a:ext>
+            </a:extLst>
+          </p:cNvPr>
+          <p:cNvCxnSpPr>
+            <a:cxnSpLocks/>
+          </p:cNvCxnSpPr>
+          <p:nvPr/>
+        </p:nvCxnSpPr>
+        <p:spPr>
+          <a:xfrm flipV="1">
+            <a:off x="4088519" y="4347686"/>
+            <a:ext cx="1146236" cy="435733"/>
+          </a:xfrm>
+          <a:prstGeom prst="line">
+            <a:avLst/>
+          </a:prstGeom>
+        </p:spPr>
+        <p:style>
+          <a:lnRef idx="1">
+            <a:schemeClr val="dk1"/>
+          </a:lnRef>
+          <a:fillRef idx="0">
+            <a:schemeClr val="dk1"/>
+          </a:fillRef>
+          <a:effectRef idx="0">
+            <a:schemeClr val="dk1"/>
+          </a:effectRef>
+          <a:fontRef idx="minor">
+            <a:schemeClr val="tx1"/>
+          </a:fontRef>
+        </p:style>
+      </p:cxnSp>
+      <p:cxnSp>
+        <p:nvCxnSpPr>
+          <p:cNvPr id="21" name="Gerade Verbindung 20">
+            <a:extLst>
+              <a:ext uri="{FF2B5EF4-FFF2-40B4-BE49-F238E27FC236}">
+                <a16:creationId xmlns:a16="http://schemas.microsoft.com/office/drawing/2014/main" id="{C222585D-92E7-E548-91E8-8815EB7BB521}"/>
+              </a:ext>
+            </a:extLst>
+          </p:cNvPr>
+          <p:cNvCxnSpPr>
+            <a:cxnSpLocks/>
+          </p:cNvCxnSpPr>
+          <p:nvPr/>
+        </p:nvCxnSpPr>
+        <p:spPr>
+          <a:xfrm>
+            <a:off x="6972300" y="2125871"/>
+            <a:ext cx="1447521" cy="943019"/>
+          </a:xfrm>
+          <a:prstGeom prst="line">
+            <a:avLst/>
+          </a:prstGeom>
+        </p:spPr>
+        <p:style>
+          <a:lnRef idx="1">
+            <a:schemeClr val="dk1"/>
+          </a:lnRef>
+          <a:fillRef idx="0">
+            <a:schemeClr val="dk1"/>
+          </a:fillRef>
+          <a:effectRef idx="0">
+            <a:schemeClr val="dk1"/>
+          </a:effectRef>
+          <a:fontRef idx="minor">
+            <a:schemeClr val="tx1"/>
+          </a:fontRef>
+        </p:style>
+      </p:cxnSp>
+      <p:cxnSp>
+        <p:nvCxnSpPr>
+          <p:cNvPr id="23" name="Gerade Verbindung 22">
+            <a:extLst>
+              <a:ext uri="{FF2B5EF4-FFF2-40B4-BE49-F238E27FC236}">
+                <a16:creationId xmlns:a16="http://schemas.microsoft.com/office/drawing/2014/main" id="{EB482467-535E-F14F-ADC3-5E0ED8533712}"/>
+              </a:ext>
+            </a:extLst>
+          </p:cNvPr>
+          <p:cNvCxnSpPr>
+            <a:cxnSpLocks/>
+          </p:cNvCxnSpPr>
+          <p:nvPr/>
+        </p:nvCxnSpPr>
+        <p:spPr>
+          <a:xfrm>
+            <a:off x="6972300" y="3355155"/>
+            <a:ext cx="1447521" cy="766458"/>
+          </a:xfrm>
+          <a:prstGeom prst="line">
+            <a:avLst/>
+          </a:prstGeom>
+        </p:spPr>
+        <p:style>
+          <a:lnRef idx="1">
+            <a:schemeClr val="dk1"/>
+          </a:lnRef>
+          <a:fillRef idx="0">
+            <a:schemeClr val="dk1"/>
+          </a:fillRef>
+          <a:effectRef idx="0">
+            <a:schemeClr val="dk1"/>
+          </a:effectRef>
+          <a:fontRef idx="minor">
+            <a:schemeClr val="tx1"/>
+          </a:fontRef>
+        </p:style>
+      </p:cxnSp>
+      <p:cxnSp>
+        <p:nvCxnSpPr>
+          <p:cNvPr id="25" name="Gerade Verbindung 24">
+            <a:extLst>
+              <a:ext uri="{FF2B5EF4-FFF2-40B4-BE49-F238E27FC236}">
+                <a16:creationId xmlns:a16="http://schemas.microsoft.com/office/drawing/2014/main" id="{1D12E614-541D-E949-8D0B-6EF7A2CC1153}"/>
+              </a:ext>
+            </a:extLst>
+          </p:cNvPr>
+          <p:cNvCxnSpPr>
+            <a:cxnSpLocks/>
+          </p:cNvCxnSpPr>
+          <p:nvPr/>
+        </p:nvCxnSpPr>
+        <p:spPr>
+          <a:xfrm>
+            <a:off x="6845951" y="2599503"/>
+            <a:ext cx="1573870" cy="978921"/>
+          </a:xfrm>
+          <a:prstGeom prst="line">
+            <a:avLst/>
+          </a:prstGeom>
+        </p:spPr>
+        <p:style>
+          <a:lnRef idx="1">
+            <a:schemeClr val="dk1"/>
+          </a:lnRef>
+          <a:fillRef idx="0">
+            <a:schemeClr val="dk1"/>
+          </a:fillRef>
+          <a:effectRef idx="0">
+            <a:schemeClr val="dk1"/>
+          </a:effectRef>
+          <a:fontRef idx="minor">
+            <a:schemeClr val="tx1"/>
+          </a:fontRef>
+        </p:style>
+      </p:cxnSp>
+      <p:cxnSp>
+        <p:nvCxnSpPr>
+          <p:cNvPr id="27" name="Gerade Verbindung 26">
+            <a:extLst>
+              <a:ext uri="{FF2B5EF4-FFF2-40B4-BE49-F238E27FC236}">
+                <a16:creationId xmlns:a16="http://schemas.microsoft.com/office/drawing/2014/main" id="{B6A75678-8563-A345-AE62-26EDB23FD58E}"/>
+              </a:ext>
+            </a:extLst>
+          </p:cNvPr>
+          <p:cNvCxnSpPr>
+            <a:cxnSpLocks/>
+          </p:cNvCxnSpPr>
+          <p:nvPr/>
+        </p:nvCxnSpPr>
+        <p:spPr>
+          <a:xfrm>
+            <a:off x="6963963" y="4121613"/>
+            <a:ext cx="1455858" cy="481701"/>
+          </a:xfrm>
+          <a:prstGeom prst="line">
+            <a:avLst/>
+          </a:prstGeom>
+        </p:spPr>
+        <p:style>
+          <a:lnRef idx="1">
+            <a:schemeClr val="dk1"/>
+          </a:lnRef>
+          <a:fillRef idx="0">
+            <a:schemeClr val="dk1"/>
+          </a:fillRef>
+          <a:effectRef idx="0">
+            <a:schemeClr val="dk1"/>
+          </a:effectRef>
+          <a:fontRef idx="minor">
+            <a:schemeClr val="tx1"/>
+          </a:fontRef>
+        </p:style>
+      </p:cxnSp>
+      <p:sp>
+        <p:nvSpPr>
+          <p:cNvPr id="29" name="Textfeld 28">
+            <a:extLst>
+              <a:ext uri="{FF2B5EF4-FFF2-40B4-BE49-F238E27FC236}">
+                <a16:creationId xmlns:a16="http://schemas.microsoft.com/office/drawing/2014/main" id="{14AD4B5B-3508-394C-A96F-00753C38B341}"/>
+              </a:ext>
+            </a:extLst>
+          </p:cNvPr>
+          <p:cNvSpPr txBox="1"/>
+          <p:nvPr/>
+        </p:nvSpPr>
+        <p:spPr>
+          <a:xfrm>
+            <a:off x="1599725" y="3310822"/>
+            <a:ext cx="1031051" cy="369332"/>
+          </a:xfrm>
+          <a:prstGeom prst="rect">
+            <a:avLst/>
+          </a:prstGeom>
+          <a:noFill/>
+        </p:spPr>
+        <p:txBody>
+          <a:bodyPr wrap="none" rtlCol="0">
+            <a:spAutoFit/>
+          </a:bodyPr>
+          <a:lstStyle/>
+          <a:p>
+            <a:r>
+              <a:rPr lang="en-GB" i="1" dirty="0">
+                <a:latin typeface="Arial" panose="020B0604020202020204" pitchFamily="34" charset="0"/>
+                <a:cs typeface="Arial" panose="020B0604020202020204" pitchFamily="34" charset="0"/>
+              </a:rPr>
+              <a:t>Housing</a:t>
+            </a:r>
+          </a:p>
+        </p:txBody>
+      </p:sp>
+      <p:cxnSp>
+        <p:nvCxnSpPr>
+          <p:cNvPr id="30" name="Gerade Verbindung 29">
+            <a:extLst>
+              <a:ext uri="{FF2B5EF4-FFF2-40B4-BE49-F238E27FC236}">
+                <a16:creationId xmlns:a16="http://schemas.microsoft.com/office/drawing/2014/main" id="{2972BE1B-5BB4-A244-9776-2E4865A9356C}"/>
+              </a:ext>
+            </a:extLst>
+          </p:cNvPr>
+          <p:cNvCxnSpPr>
+            <a:cxnSpLocks/>
+          </p:cNvCxnSpPr>
+          <p:nvPr/>
+        </p:nvCxnSpPr>
+        <p:spPr>
+          <a:xfrm flipV="1">
+            <a:off x="2642615" y="2597380"/>
+            <a:ext cx="1895201" cy="923658"/>
+          </a:xfrm>
+          <a:prstGeom prst="line">
+            <a:avLst/>
+          </a:prstGeom>
+        </p:spPr>
+        <p:style>
+          <a:lnRef idx="1">
+            <a:schemeClr val="dk1"/>
+          </a:lnRef>
+          <a:fillRef idx="0">
+            <a:schemeClr val="dk1"/>
+          </a:fillRef>
+          <a:effectRef idx="0">
+            <a:schemeClr val="dk1"/>
+          </a:effectRef>
+          <a:fontRef idx="minor">
+            <a:schemeClr val="tx1"/>
+          </a:fontRef>
+        </p:style>
+      </p:cxnSp>
+    </p:spTree>
+    <p:extLst>
+      <p:ext uri="{BB962C8B-B14F-4D97-AF65-F5344CB8AC3E}">
+        <p14:creationId xmlns:p14="http://schemas.microsoft.com/office/powerpoint/2010/main" val="2042041643"/>
       </p:ext>
     </p:extLst>
   </p:cSld>

</xml_diff>

<commit_message>
Updating the electronics chart with new ADC converter
</commit_message>
<xml_diff>
--- a/IMAGES/FIGURES.pptx
+++ b/IMAGES/FIGURES.pptx
@@ -262,7 +262,7 @@
           <a:p>
             <a:fld id="{BF297D92-DF44-6642-BFE1-7F3863464EBA}" type="datetimeFigureOut">
               <a:rPr lang="en-GB" smtClean="0"/>
-              <a:t>06/06/2021</a:t>
+              <a:t>08/06/2021</a:t>
             </a:fld>
             <a:endParaRPr lang="en-GB"/>
           </a:p>
@@ -462,7 +462,7 @@
           <a:p>
             <a:fld id="{BF297D92-DF44-6642-BFE1-7F3863464EBA}" type="datetimeFigureOut">
               <a:rPr lang="en-GB" smtClean="0"/>
-              <a:t>06/06/2021</a:t>
+              <a:t>08/06/2021</a:t>
             </a:fld>
             <a:endParaRPr lang="en-GB"/>
           </a:p>
@@ -672,7 +672,7 @@
           <a:p>
             <a:fld id="{BF297D92-DF44-6642-BFE1-7F3863464EBA}" type="datetimeFigureOut">
               <a:rPr lang="en-GB" smtClean="0"/>
-              <a:t>06/06/2021</a:t>
+              <a:t>08/06/2021</a:t>
             </a:fld>
             <a:endParaRPr lang="en-GB"/>
           </a:p>
@@ -872,7 +872,7 @@
           <a:p>
             <a:fld id="{BF297D92-DF44-6642-BFE1-7F3863464EBA}" type="datetimeFigureOut">
               <a:rPr lang="en-GB" smtClean="0"/>
-              <a:t>06/06/2021</a:t>
+              <a:t>08/06/2021</a:t>
             </a:fld>
             <a:endParaRPr lang="en-GB"/>
           </a:p>
@@ -1148,7 +1148,7 @@
           <a:p>
             <a:fld id="{BF297D92-DF44-6642-BFE1-7F3863464EBA}" type="datetimeFigureOut">
               <a:rPr lang="en-GB" smtClean="0"/>
-              <a:t>06/06/2021</a:t>
+              <a:t>08/06/2021</a:t>
             </a:fld>
             <a:endParaRPr lang="en-GB"/>
           </a:p>
@@ -1416,7 +1416,7 @@
           <a:p>
             <a:fld id="{BF297D92-DF44-6642-BFE1-7F3863464EBA}" type="datetimeFigureOut">
               <a:rPr lang="en-GB" smtClean="0"/>
-              <a:t>06/06/2021</a:t>
+              <a:t>08/06/2021</a:t>
             </a:fld>
             <a:endParaRPr lang="en-GB"/>
           </a:p>
@@ -1831,7 +1831,7 @@
           <a:p>
             <a:fld id="{BF297D92-DF44-6642-BFE1-7F3863464EBA}" type="datetimeFigureOut">
               <a:rPr lang="en-GB" smtClean="0"/>
-              <a:t>06/06/2021</a:t>
+              <a:t>08/06/2021</a:t>
             </a:fld>
             <a:endParaRPr lang="en-GB"/>
           </a:p>
@@ -1973,7 +1973,7 @@
           <a:p>
             <a:fld id="{BF297D92-DF44-6642-BFE1-7F3863464EBA}" type="datetimeFigureOut">
               <a:rPr lang="en-GB" smtClean="0"/>
-              <a:t>06/06/2021</a:t>
+              <a:t>08/06/2021</a:t>
             </a:fld>
             <a:endParaRPr lang="en-GB"/>
           </a:p>
@@ -2086,7 +2086,7 @@
           <a:p>
             <a:fld id="{BF297D92-DF44-6642-BFE1-7F3863464EBA}" type="datetimeFigureOut">
               <a:rPr lang="en-GB" smtClean="0"/>
-              <a:t>06/06/2021</a:t>
+              <a:t>08/06/2021</a:t>
             </a:fld>
             <a:endParaRPr lang="en-GB"/>
           </a:p>
@@ -2399,7 +2399,7 @@
           <a:p>
             <a:fld id="{BF297D92-DF44-6642-BFE1-7F3863464EBA}" type="datetimeFigureOut">
               <a:rPr lang="en-GB" smtClean="0"/>
-              <a:t>06/06/2021</a:t>
+              <a:t>08/06/2021</a:t>
             </a:fld>
             <a:endParaRPr lang="en-GB"/>
           </a:p>
@@ -2688,7 +2688,7 @@
           <a:p>
             <a:fld id="{BF297D92-DF44-6642-BFE1-7F3863464EBA}" type="datetimeFigureOut">
               <a:rPr lang="en-GB" smtClean="0"/>
-              <a:t>06/06/2021</a:t>
+              <a:t>08/06/2021</a:t>
             </a:fld>
             <a:endParaRPr lang="en-GB"/>
           </a:p>
@@ -2931,7 +2931,7 @@
           <a:p>
             <a:fld id="{BF297D92-DF44-6642-BFE1-7F3863464EBA}" type="datetimeFigureOut">
               <a:rPr lang="en-GB" smtClean="0"/>
-              <a:t>06/06/2021</a:t>
+              <a:t>08/06/2021</a:t>
             </a:fld>
             <a:endParaRPr lang="en-GB"/>
           </a:p>
@@ -3397,10 +3397,10 @@
       </p:pic>
       <p:pic>
         <p:nvPicPr>
-          <p:cNvPr id="1028" name="Picture 4" descr="速卖主图">
-            <a:extLst>
-              <a:ext uri="{FF2B5EF4-FFF2-40B4-BE49-F238E27FC236}">
-                <a16:creationId xmlns:a16="http://schemas.microsoft.com/office/drawing/2014/main" id="{DB11E5A6-F53E-5A4E-83E9-C2D9969DB70C}"/>
+          <p:cNvPr id="1030" name="Picture 6" descr="1012">
+            <a:extLst>
+              <a:ext uri="{FF2B5EF4-FFF2-40B4-BE49-F238E27FC236}">
+                <a16:creationId xmlns:a16="http://schemas.microsoft.com/office/drawing/2014/main" id="{89A9EF19-4815-684E-B5F9-94AA057C9813}"/>
               </a:ext>
             </a:extLst>
           </p:cNvPr>
@@ -3412,45 +3412,18 @@
         <p:blipFill rotWithShape="1">
           <a:blip r:embed="rId3">
             <a:extLst>
-              <a:ext uri="{BEBA8EAE-BF5A-486C-A8C5-ECC9F3942E4B}">
-                <a14:imgProps xmlns:a14="http://schemas.microsoft.com/office/drawing/2010/main">
-                  <a14:imgLayer r:embed="rId4">
-                    <a14:imgEffect>
-                      <a14:backgroundRemoval t="27500" b="82875" l="26500" r="90375">
-                        <a14:foregroundMark x1="71500" y1="31375" x2="79250" y2="30250"/>
-                        <a14:foregroundMark x1="79250" y1="30250" x2="85000" y2="41750"/>
-                        <a14:foregroundMark x1="85000" y1="41750" x2="84250" y2="51125"/>
-                        <a14:foregroundMark x1="84250" y1="51125" x2="73875" y2="51375"/>
-                        <a14:foregroundMark x1="73875" y1="51375" x2="36125" y2="76375"/>
-                        <a14:foregroundMark x1="36125" y1="76375" x2="44250" y2="76250"/>
-                        <a14:foregroundMark x1="44250" y1="76250" x2="26625" y2="61125"/>
-                        <a14:foregroundMark x1="26625" y1="61125" x2="31000" y2="58500"/>
-                        <a14:foregroundMark x1="86125" y1="44500" x2="88875" y2="37500"/>
-                        <a14:foregroundMark x1="88875" y1="37500" x2="88125" y2="35125"/>
-                        <a14:foregroundMark x1="86625" y1="30750" x2="79625" y2="27500"/>
-                        <a14:foregroundMark x1="79625" y1="27500" x2="90375" y2="42500"/>
-                        <a14:foregroundMark x1="28750" y1="65000" x2="37875" y2="76875"/>
-                        <a14:foregroundMark x1="37875" y1="76875" x2="42250" y2="74750"/>
-                        <a14:foregroundMark x1="42125" y1="75625" x2="40500" y2="82875"/>
-                        <a14:foregroundMark x1="35125" y1="65750" x2="26500" y2="63125"/>
-                        <a14:foregroundMark x1="26500" y1="63125" x2="27000" y2="65500"/>
-                      </a14:backgroundRemoval>
-                    </a14:imgEffect>
-                  </a14:imgLayer>
-                </a14:imgProps>
-              </a:ext>
               <a:ext uri="{28A0092B-C50C-407E-A947-70E740481C1C}">
                 <a14:useLocalDpi xmlns:a14="http://schemas.microsoft.com/office/drawing/2010/main" val="0"/>
               </a:ext>
             </a:extLst>
           </a:blip>
-          <a:srcRect l="24000" t="24000" r="6444" b="18667"/>
+          <a:srcRect l="33828" t="29101" r="33828" b="24613"/>
           <a:stretch/>
         </p:blipFill>
         <p:spPr bwMode="auto">
           <a:xfrm>
-            <a:off x="6517317" y="1922098"/>
-            <a:ext cx="3429000" cy="2826460"/>
+            <a:off x="10791572" y="449275"/>
+            <a:ext cx="1367882" cy="1839952"/>
           </a:xfrm>
           <a:prstGeom prst="rect">
             <a:avLst/>
@@ -3469,10 +3442,10 @@
       </p:pic>
       <p:pic>
         <p:nvPicPr>
-          <p:cNvPr id="1030" name="Picture 6" descr="1012">
-            <a:extLst>
-              <a:ext uri="{FF2B5EF4-FFF2-40B4-BE49-F238E27FC236}">
-                <a16:creationId xmlns:a16="http://schemas.microsoft.com/office/drawing/2014/main" id="{89A9EF19-4815-684E-B5F9-94AA057C9813}"/>
+          <p:cNvPr id="1032" name="Picture 8">
+            <a:extLst>
+              <a:ext uri="{FF2B5EF4-FFF2-40B4-BE49-F238E27FC236}">
+                <a16:creationId xmlns:a16="http://schemas.microsoft.com/office/drawing/2014/main" id="{DD80E242-53BC-D74E-9262-80B98D1A2669}"/>
               </a:ext>
             </a:extLst>
           </p:cNvPr>
@@ -3482,56 +3455,11 @@
           <p:nvPr/>
         </p:nvPicPr>
         <p:blipFill rotWithShape="1">
-          <a:blip r:embed="rId5">
-            <a:extLst>
-              <a:ext uri="{28A0092B-C50C-407E-A947-70E740481C1C}">
-                <a14:useLocalDpi xmlns:a14="http://schemas.microsoft.com/office/drawing/2010/main" val="0"/>
-              </a:ext>
-            </a:extLst>
-          </a:blip>
-          <a:srcRect l="33828" t="29101" r="33828" b="24613"/>
-          <a:stretch/>
-        </p:blipFill>
-        <p:spPr bwMode="auto">
-          <a:xfrm>
-            <a:off x="10791572" y="449275"/>
-            <a:ext cx="1367882" cy="1839952"/>
-          </a:xfrm>
-          <a:prstGeom prst="rect">
-            <a:avLst/>
-          </a:prstGeom>
-          <a:noFill/>
-          <a:extLst>
-            <a:ext uri="{909E8E84-426E-40DD-AFC4-6F175D3DCCD1}">
-              <a14:hiddenFill xmlns:a14="http://schemas.microsoft.com/office/drawing/2010/main">
-                <a:solidFill>
-                  <a:srgbClr val="FFFFFF"/>
-                </a:solidFill>
-              </a14:hiddenFill>
-            </a:ext>
-          </a:extLst>
-        </p:spPr>
-      </p:pic>
-      <p:pic>
-        <p:nvPicPr>
-          <p:cNvPr id="1032" name="Picture 8">
-            <a:extLst>
-              <a:ext uri="{FF2B5EF4-FFF2-40B4-BE49-F238E27FC236}">
-                <a16:creationId xmlns:a16="http://schemas.microsoft.com/office/drawing/2014/main" id="{DD80E242-53BC-D74E-9262-80B98D1A2669}"/>
-              </a:ext>
-            </a:extLst>
-          </p:cNvPr>
-          <p:cNvPicPr>
-            <a:picLocks noChangeAspect="1" noChangeArrowheads="1"/>
-          </p:cNvPicPr>
-          <p:nvPr/>
-        </p:nvPicPr>
-        <p:blipFill rotWithShape="1">
-          <a:blip r:embed="rId6">
+          <a:blip r:embed="rId4">
             <a:extLst>
               <a:ext uri="{BEBA8EAE-BF5A-486C-A8C5-ECC9F3942E4B}">
                 <a14:imgProps xmlns:a14="http://schemas.microsoft.com/office/drawing/2010/main">
-                  <a14:imgLayer r:embed="rId7">
+                  <a14:imgLayer r:embed="rId5">
                     <a14:imgEffect>
                       <a14:backgroundRemoval t="5000" b="53906" l="3438" r="63750">
                         <a14:foregroundMark x1="54688" y1="10781" x2="40938" y2="7813"/>
@@ -3591,7 +3519,7 @@
           <p:nvPr/>
         </p:nvPicPr>
         <p:blipFill rotWithShape="1">
-          <a:blip r:embed="rId8">
+          <a:blip r:embed="rId6">
             <a:extLst>
               <a:ext uri="{28A0092B-C50C-407E-A947-70E740481C1C}">
                 <a14:useLocalDpi xmlns:a14="http://schemas.microsoft.com/office/drawing/2010/main" val="0"/>
@@ -3848,10 +3776,10 @@
       </p:sp>
       <p:cxnSp>
         <p:nvCxnSpPr>
-          <p:cNvPr id="18" name="Gerade Verbindung 17">
-            <a:extLst>
-              <a:ext uri="{FF2B5EF4-FFF2-40B4-BE49-F238E27FC236}">
-                <a16:creationId xmlns:a16="http://schemas.microsoft.com/office/drawing/2014/main" id="{5D80ECD8-327C-B942-8964-3160863BE629}"/>
+          <p:cNvPr id="21" name="Gerade Verbindung 20">
+            <a:extLst>
+              <a:ext uri="{FF2B5EF4-FFF2-40B4-BE49-F238E27FC236}">
+                <a16:creationId xmlns:a16="http://schemas.microsoft.com/office/drawing/2014/main" id="{413D5540-87F1-5044-B7EE-042936024F17}"/>
               </a:ext>
             </a:extLst>
           </p:cNvPr>
@@ -3862,15 +3790,15 @@
         </p:nvCxnSpPr>
         <p:spPr>
           <a:xfrm>
-            <a:off x="4285670" y="4227341"/>
-            <a:ext cx="2231647" cy="0"/>
+            <a:off x="7465315" y="2255519"/>
+            <a:ext cx="3521553" cy="0"/>
           </a:xfrm>
           <a:prstGeom prst="line">
             <a:avLst/>
           </a:prstGeom>
           <a:ln w="76200">
             <a:solidFill>
-              <a:srgbClr val="FF0000"/>
+              <a:srgbClr val="92D050"/>
             </a:solidFill>
           </a:ln>
         </p:spPr>
@@ -3891,10 +3819,10 @@
       </p:cxnSp>
       <p:sp>
         <p:nvSpPr>
-          <p:cNvPr id="20" name="Textfeld 19">
-            <a:extLst>
-              <a:ext uri="{FF2B5EF4-FFF2-40B4-BE49-F238E27FC236}">
-                <a16:creationId xmlns:a16="http://schemas.microsoft.com/office/drawing/2014/main" id="{B236FF79-FDDC-5D4D-A9D9-801272587878}"/>
+          <p:cNvPr id="23" name="Textfeld 22">
+            <a:extLst>
+              <a:ext uri="{FF2B5EF4-FFF2-40B4-BE49-F238E27FC236}">
+                <a16:creationId xmlns:a16="http://schemas.microsoft.com/office/drawing/2014/main" id="{292E0F28-4423-5F4B-A308-8B51829DC7D6}"/>
               </a:ext>
             </a:extLst>
           </p:cNvPr>
@@ -3903,8 +3831,8 @@
         </p:nvSpPr>
         <p:spPr>
           <a:xfrm>
-            <a:off x="4304180" y="4358031"/>
-            <a:ext cx="2741007" cy="923330"/>
+            <a:off x="10152185" y="2441892"/>
+            <a:ext cx="2299027" cy="923330"/>
           </a:xfrm>
           <a:prstGeom prst="rect">
             <a:avLst/>
@@ -3919,119 +3847,63 @@
           <a:p>
             <a:r>
               <a:rPr lang="en-GB" b="1" i="1" dirty="0"/>
-              <a:t>Analog: </a:t>
+              <a:t>Oxygen In:</a:t>
             </a:r>
           </a:p>
           <a:p>
             <a:r>
               <a:rPr lang="en-GB" dirty="0"/>
-              <a:t>On OPAMP: VCC, GND, Out</a:t>
+              <a:t>On Sensor: Pin 1, Pin 3</a:t>
             </a:r>
           </a:p>
           <a:p>
             <a:r>
               <a:rPr lang="en-GB" dirty="0"/>
-              <a:t>On ESP: 3V3, GND, GPIO15 </a:t>
-            </a:r>
-          </a:p>
-        </p:txBody>
-      </p:sp>
-      <p:cxnSp>
-        <p:nvCxnSpPr>
-          <p:cNvPr id="21" name="Gerade Verbindung 20">
-            <a:extLst>
-              <a:ext uri="{FF2B5EF4-FFF2-40B4-BE49-F238E27FC236}">
-                <a16:creationId xmlns:a16="http://schemas.microsoft.com/office/drawing/2014/main" id="{413D5540-87F1-5044-B7EE-042936024F17}"/>
-              </a:ext>
-            </a:extLst>
-          </p:cNvPr>
-          <p:cNvCxnSpPr>
-            <a:cxnSpLocks/>
-          </p:cNvCxnSpPr>
+              <a:t>On OPAMP: IN, GND</a:t>
+            </a:r>
+          </a:p>
+        </p:txBody>
+      </p:sp>
+      <p:sp>
+        <p:nvSpPr>
+          <p:cNvPr id="13" name="Rechteck 12">
+            <a:extLst>
+              <a:ext uri="{FF2B5EF4-FFF2-40B4-BE49-F238E27FC236}">
+                <a16:creationId xmlns:a16="http://schemas.microsoft.com/office/drawing/2014/main" id="{725DE345-99C7-D447-81D0-09D40064AC8A}"/>
+              </a:ext>
+            </a:extLst>
+          </p:cNvPr>
+          <p:cNvSpPr/>
           <p:nvPr/>
-        </p:nvCxnSpPr>
-        <p:spPr>
-          <a:xfrm>
-            <a:off x="9755658" y="2255519"/>
-            <a:ext cx="1231210" cy="0"/>
-          </a:xfrm>
-          <a:prstGeom prst="line">
-            <a:avLst/>
-          </a:prstGeom>
-          <a:ln w="76200">
-            <a:solidFill>
-              <a:srgbClr val="92D050"/>
-            </a:solidFill>
-          </a:ln>
-        </p:spPr>
-        <p:style>
-          <a:lnRef idx="1">
-            <a:schemeClr val="accent1"/>
-          </a:lnRef>
-          <a:fillRef idx="0">
-            <a:schemeClr val="accent1"/>
-          </a:fillRef>
-          <a:effectRef idx="0">
-            <a:schemeClr val="accent1"/>
-          </a:effectRef>
-          <a:fontRef idx="minor">
-            <a:schemeClr val="tx1"/>
-          </a:fontRef>
-        </p:style>
-      </p:cxnSp>
-      <p:sp>
-        <p:nvSpPr>
-          <p:cNvPr id="23" name="Textfeld 22">
-            <a:extLst>
-              <a:ext uri="{FF2B5EF4-FFF2-40B4-BE49-F238E27FC236}">
-                <a16:creationId xmlns:a16="http://schemas.microsoft.com/office/drawing/2014/main" id="{292E0F28-4423-5F4B-A308-8B51829DC7D6}"/>
-              </a:ext>
-            </a:extLst>
-          </p:cNvPr>
-          <p:cNvSpPr txBox="1"/>
-          <p:nvPr/>
-        </p:nvSpPr>
-        <p:spPr>
-          <a:xfrm>
-            <a:off x="10152185" y="2441892"/>
-            <a:ext cx="2299027" cy="923330"/>
+        </p:nvSpPr>
+        <p:spPr>
+          <a:xfrm>
+            <a:off x="2429203" y="949041"/>
+            <a:ext cx="1678601" cy="369332"/>
           </a:xfrm>
           <a:prstGeom prst="rect">
             <a:avLst/>
           </a:prstGeom>
-          <a:noFill/>
-        </p:spPr>
-        <p:txBody>
-          <a:bodyPr wrap="none" rtlCol="0">
+        </p:spPr>
+        <p:txBody>
+          <a:bodyPr wrap="none">
             <a:spAutoFit/>
           </a:bodyPr>
           <a:lstStyle/>
           <a:p>
             <a:r>
               <a:rPr lang="en-GB" b="1" i="1" dirty="0"/>
-              <a:t>Oxygen In:</a:t>
-            </a:r>
-          </a:p>
-          <a:p>
-            <a:r>
-              <a:rPr lang="en-GB" dirty="0"/>
-              <a:t>On Sensor: Pin 1, Pin 3</a:t>
-            </a:r>
-          </a:p>
-          <a:p>
-            <a:r>
-              <a:rPr lang="en-GB" dirty="0"/>
-              <a:t>On OPAMP: IN, GND</a:t>
-            </a:r>
-          </a:p>
-        </p:txBody>
-      </p:sp>
-      <p:sp>
-        <p:nvSpPr>
-          <p:cNvPr id="13" name="Rechteck 12">
-            <a:extLst>
-              <a:ext uri="{FF2B5EF4-FFF2-40B4-BE49-F238E27FC236}">
-                <a16:creationId xmlns:a16="http://schemas.microsoft.com/office/drawing/2014/main" id="{725DE345-99C7-D447-81D0-09D40064AC8A}"/>
+              <a:t>ESP32 WROVER</a:t>
+            </a:r>
+          </a:p>
+        </p:txBody>
+      </p:sp>
+      <p:sp>
+        <p:nvSpPr>
+          <p:cNvPr id="25" name="Rechteck 24">
+            <a:extLst>
+              <a:ext uri="{FF2B5EF4-FFF2-40B4-BE49-F238E27FC236}">
+                <a16:creationId xmlns:a16="http://schemas.microsoft.com/office/drawing/2014/main" id="{2DC21FF7-09CB-DB4C-BC5E-A22BD8BD0F12}"/>
               </a:ext>
             </a:extLst>
           </p:cNvPr>
@@ -4040,8 +3912,8 @@
         </p:nvSpPr>
         <p:spPr>
           <a:xfrm>
-            <a:off x="2429203" y="949041"/>
-            <a:ext cx="1678601" cy="369332"/>
+            <a:off x="7410590" y="1598766"/>
+            <a:ext cx="1045479" cy="369332"/>
           </a:xfrm>
           <a:prstGeom prst="rect">
             <a:avLst/>
@@ -4055,41 +3927,7 @@
           <a:p>
             <a:r>
               <a:rPr lang="en-GB" b="1" i="1" dirty="0"/>
-              <a:t>ESP32 WROVER</a:t>
-            </a:r>
-          </a:p>
-        </p:txBody>
-      </p:sp>
-      <p:sp>
-        <p:nvSpPr>
-          <p:cNvPr id="25" name="Rechteck 24">
-            <a:extLst>
-              <a:ext uri="{FF2B5EF4-FFF2-40B4-BE49-F238E27FC236}">
-                <a16:creationId xmlns:a16="http://schemas.microsoft.com/office/drawing/2014/main" id="{2DC21FF7-09CB-DB4C-BC5E-A22BD8BD0F12}"/>
-              </a:ext>
-            </a:extLst>
-          </p:cNvPr>
-          <p:cNvSpPr/>
-          <p:nvPr/>
-        </p:nvSpPr>
-        <p:spPr>
-          <a:xfrm>
-            <a:off x="6311449" y="2922548"/>
-            <a:ext cx="835485" cy="369332"/>
-          </a:xfrm>
-          <a:prstGeom prst="rect">
-            <a:avLst/>
-          </a:prstGeom>
-        </p:spPr>
-        <p:txBody>
-          <a:bodyPr wrap="none">
-            <a:spAutoFit/>
-          </a:bodyPr>
-          <a:lstStyle/>
-          <a:p>
-            <a:r>
-              <a:rPr lang="en-GB" b="1" i="1" dirty="0"/>
-              <a:t>LM386</a:t>
+              <a:t>ADS1115</a:t>
             </a:r>
           </a:p>
         </p:txBody>
@@ -4238,7 +4076,7 @@
           <p:nvPr/>
         </p:nvPicPr>
         <p:blipFill>
-          <a:blip r:embed="rId9">
+          <a:blip r:embed="rId7">
             <a:extLst>
               <a:ext uri="{28A0092B-C50C-407E-A947-70E740481C1C}">
                 <a14:useLocalDpi xmlns:a14="http://schemas.microsoft.com/office/drawing/2010/main" val="0"/>
@@ -4488,6 +4326,139 @@
           </a:p>
         </p:txBody>
       </p:sp>
+      <p:pic>
+        <p:nvPicPr>
+          <p:cNvPr id="3" name="Picture 2" descr="Entwicklerboards - A/D-Verstärker-Platine, 16-Bit, ADS1115 - DEBO AMP 16BIT">
+            <a:extLst>
+              <a:ext uri="{FF2B5EF4-FFF2-40B4-BE49-F238E27FC236}">
+                <a16:creationId xmlns:a16="http://schemas.microsoft.com/office/drawing/2014/main" id="{D67A3752-B33D-1F43-9A8C-81FE2D85B552}"/>
+              </a:ext>
+            </a:extLst>
+          </p:cNvPr>
+          <p:cNvPicPr>
+            <a:picLocks noChangeAspect="1" noChangeArrowheads="1"/>
+          </p:cNvPicPr>
+          <p:nvPr/>
+        </p:nvPicPr>
+        <p:blipFill>
+          <a:blip r:embed="rId8">
+            <a:extLst>
+              <a:ext uri="{28A0092B-C50C-407E-A947-70E740481C1C}">
+                <a14:useLocalDpi xmlns:a14="http://schemas.microsoft.com/office/drawing/2010/main" val="0"/>
+              </a:ext>
+            </a:extLst>
+          </a:blip>
+          <a:srcRect/>
+          <a:stretch>
+            <a:fillRect/>
+          </a:stretch>
+        </p:blipFill>
+        <p:spPr bwMode="auto">
+          <a:xfrm>
+            <a:off x="4595159" y="938404"/>
+            <a:ext cx="3606800" cy="3606800"/>
+          </a:xfrm>
+          <a:prstGeom prst="rect">
+            <a:avLst/>
+          </a:prstGeom>
+          <a:noFill/>
+          <a:extLst>
+            <a:ext uri="{909E8E84-426E-40DD-AFC4-6F175D3DCCD1}">
+              <a14:hiddenFill xmlns:a14="http://schemas.microsoft.com/office/drawing/2010/main">
+                <a:solidFill>
+                  <a:srgbClr val="FFFFFF"/>
+                </a:solidFill>
+              </a14:hiddenFill>
+            </a:ext>
+          </a:extLst>
+        </p:spPr>
+      </p:pic>
+      <p:cxnSp>
+        <p:nvCxnSpPr>
+          <p:cNvPr id="31" name="Gerade Verbindung 30">
+            <a:extLst>
+              <a:ext uri="{FF2B5EF4-FFF2-40B4-BE49-F238E27FC236}">
+                <a16:creationId xmlns:a16="http://schemas.microsoft.com/office/drawing/2014/main" id="{8FFBC876-B0AD-FE4A-8E09-8C904FD93D02}"/>
+              </a:ext>
+            </a:extLst>
+          </p:cNvPr>
+          <p:cNvCxnSpPr>
+            <a:cxnSpLocks/>
+          </p:cNvCxnSpPr>
+          <p:nvPr/>
+        </p:nvCxnSpPr>
+        <p:spPr>
+          <a:xfrm>
+            <a:off x="2034838" y="4807076"/>
+            <a:ext cx="4043233" cy="0"/>
+          </a:xfrm>
+          <a:prstGeom prst="line">
+            <a:avLst/>
+          </a:prstGeom>
+          <a:ln w="76200">
+            <a:solidFill>
+              <a:srgbClr val="7030A0"/>
+            </a:solidFill>
+          </a:ln>
+        </p:spPr>
+        <p:style>
+          <a:lnRef idx="1">
+            <a:schemeClr val="accent1"/>
+          </a:lnRef>
+          <a:fillRef idx="0">
+            <a:schemeClr val="accent1"/>
+          </a:fillRef>
+          <a:effectRef idx="0">
+            <a:schemeClr val="accent1"/>
+          </a:effectRef>
+          <a:fontRef idx="minor">
+            <a:schemeClr val="tx1"/>
+          </a:fontRef>
+        </p:style>
+      </p:cxnSp>
+      <p:cxnSp>
+        <p:nvCxnSpPr>
+          <p:cNvPr id="32" name="Gerade Verbindung 31">
+            <a:extLst>
+              <a:ext uri="{FF2B5EF4-FFF2-40B4-BE49-F238E27FC236}">
+                <a16:creationId xmlns:a16="http://schemas.microsoft.com/office/drawing/2014/main" id="{609BAA82-4217-7945-BA21-51066212DB59}"/>
+              </a:ext>
+            </a:extLst>
+          </p:cNvPr>
+          <p:cNvCxnSpPr>
+            <a:cxnSpLocks/>
+          </p:cNvCxnSpPr>
+          <p:nvPr/>
+        </p:nvCxnSpPr>
+        <p:spPr>
+          <a:xfrm>
+            <a:off x="6060142" y="3944470"/>
+            <a:ext cx="0" cy="862606"/>
+          </a:xfrm>
+          <a:prstGeom prst="line">
+            <a:avLst/>
+          </a:prstGeom>
+          <a:ln w="76200">
+            <a:solidFill>
+              <a:srgbClr val="7030A0"/>
+            </a:solidFill>
+          </a:ln>
+        </p:spPr>
+        <p:style>
+          <a:lnRef idx="1">
+            <a:schemeClr val="accent1"/>
+          </a:lnRef>
+          <a:fillRef idx="0">
+            <a:schemeClr val="accent1"/>
+          </a:fillRef>
+          <a:effectRef idx="0">
+            <a:schemeClr val="accent1"/>
+          </a:effectRef>
+          <a:fontRef idx="minor">
+            <a:schemeClr val="tx1"/>
+          </a:fontRef>
+        </p:style>
+      </p:cxnSp>
     </p:spTree>
     <p:extLst>
       <p:ext uri="{BB962C8B-B14F-4D97-AF65-F5344CB8AC3E}">

</xml_diff>